<commit_message>
MAJ du cours sur les réponses harmoniques
</commit_message>
<xml_diff>
--- a/7_ReponsesHarmoniques/Cours/png/Figures.pptx
+++ b/7_ReponsesHarmoniques/Cours/png/Figures.pptx
@@ -5,11 +5,12 @@
     <p:sldMasterId id="2147483648" r:id="rId1"/>
   </p:sldMasterIdLst>
   <p:notesMasterIdLst>
-    <p:notesMasterId r:id="rId4"/>
+    <p:notesMasterId r:id="rId5"/>
   </p:notesMasterIdLst>
   <p:sldIdLst>
     <p:sldId id="256" r:id="rId2"/>
     <p:sldId id="257" r:id="rId3"/>
+    <p:sldId id="258" r:id="rId4"/>
   </p:sldIdLst>
   <p:sldSz cx="9144000" cy="6858000" type="screen4x3"/>
   <p:notesSz cx="6858000" cy="9144000"/>
@@ -193,7 +194,8 @@
           <a:p>
             <a:fld id="{5E72CBEE-9EF6-4439-8535-1EC217B9AD94}" type="datetimeFigureOut">
               <a:rPr lang="fr-FR" smtClean="0"/>
-              <a:t>02/02/2014</a:t>
+              <a:pPr/>
+              <a:t>04/02/2014</a:t>
             </a:fld>
             <a:endParaRPr lang="fr-FR"/>
           </a:p>
@@ -352,6 +354,7 @@
           <a:p>
             <a:fld id="{39388614-5F5E-47A3-9DD2-BA259B166064}" type="slidenum">
               <a:rPr lang="fr-FR" smtClean="0"/>
+              <a:pPr/>
               <a:t>‹N°›</a:t>
             </a:fld>
             <a:endParaRPr lang="fr-FR"/>
@@ -361,7 +364,7 @@
     </p:spTree>
     <p:extLst>
       <p:ext uri="{BB962C8B-B14F-4D97-AF65-F5344CB8AC3E}">
-        <p14:creationId xmlns:p14="http://schemas.microsoft.com/office/powerpoint/2010/main" val="2741638888"/>
+        <p14:creationId xmlns:p14="http://schemas.microsoft.com/office/powerpoint/2010/main" xmlns="" val="2741638888"/>
       </p:ext>
     </p:extLst>
   </p:cSld>
@@ -526,6 +529,7 @@
           <a:p>
             <a:fld id="{39388614-5F5E-47A3-9DD2-BA259B166064}" type="slidenum">
               <a:rPr lang="fr-FR" smtClean="0"/>
+              <a:pPr/>
               <a:t>2</a:t>
             </a:fld>
             <a:endParaRPr lang="fr-FR"/>
@@ -535,7 +539,7 @@
     </p:spTree>
     <p:extLst>
       <p:ext uri="{BB962C8B-B14F-4D97-AF65-F5344CB8AC3E}">
-        <p14:creationId xmlns:p14="http://schemas.microsoft.com/office/powerpoint/2010/main" val="1580886439"/>
+        <p14:creationId xmlns:p14="http://schemas.microsoft.com/office/powerpoint/2010/main" xmlns="" val="1580886439"/>
       </p:ext>
     </p:extLst>
   </p:cSld>
@@ -726,7 +730,8 @@
           <a:p>
             <a:fld id="{AA309A6D-C09C-4548-B29A-6CF363A7E532}" type="datetimeFigureOut">
               <a:rPr lang="fr-FR" smtClean="0"/>
-              <a:t>02/02/2014</a:t>
+              <a:pPr/>
+              <a:t>04/02/2014</a:t>
             </a:fld>
             <a:endParaRPr lang="fr-BE"/>
           </a:p>
@@ -768,6 +773,7 @@
           <a:p>
             <a:fld id="{CF4668DC-857F-487D-BFFA-8C0CA5037977}" type="slidenum">
               <a:rPr lang="fr-BE" smtClean="0"/>
+              <a:pPr/>
               <a:t>‹N°›</a:t>
             </a:fld>
             <a:endParaRPr lang="fr-BE"/>
@@ -891,7 +897,8 @@
           <a:p>
             <a:fld id="{AA309A6D-C09C-4548-B29A-6CF363A7E532}" type="datetimeFigureOut">
               <a:rPr lang="fr-FR" smtClean="0"/>
-              <a:t>02/02/2014</a:t>
+              <a:pPr/>
+              <a:t>04/02/2014</a:t>
             </a:fld>
             <a:endParaRPr lang="fr-BE"/>
           </a:p>
@@ -933,6 +940,7 @@
           <a:p>
             <a:fld id="{CF4668DC-857F-487D-BFFA-8C0CA5037977}" type="slidenum">
               <a:rPr lang="fr-BE" smtClean="0"/>
+              <a:pPr/>
               <a:t>‹N°›</a:t>
             </a:fld>
             <a:endParaRPr lang="fr-BE"/>
@@ -1066,7 +1074,8 @@
           <a:p>
             <a:fld id="{AA309A6D-C09C-4548-B29A-6CF363A7E532}" type="datetimeFigureOut">
               <a:rPr lang="fr-FR" smtClean="0"/>
-              <a:t>02/02/2014</a:t>
+              <a:pPr/>
+              <a:t>04/02/2014</a:t>
             </a:fld>
             <a:endParaRPr lang="fr-BE"/>
           </a:p>
@@ -1108,6 +1117,7 @@
           <a:p>
             <a:fld id="{CF4668DC-857F-487D-BFFA-8C0CA5037977}" type="slidenum">
               <a:rPr lang="fr-BE" smtClean="0"/>
+              <a:pPr/>
               <a:t>‹N°›</a:t>
             </a:fld>
             <a:endParaRPr lang="fr-BE"/>
@@ -1231,7 +1241,8 @@
           <a:p>
             <a:fld id="{AA309A6D-C09C-4548-B29A-6CF363A7E532}" type="datetimeFigureOut">
               <a:rPr lang="fr-FR" smtClean="0"/>
-              <a:t>02/02/2014</a:t>
+              <a:pPr/>
+              <a:t>04/02/2014</a:t>
             </a:fld>
             <a:endParaRPr lang="fr-BE"/>
           </a:p>
@@ -1273,6 +1284,7 @@
           <a:p>
             <a:fld id="{CF4668DC-857F-487D-BFFA-8C0CA5037977}" type="slidenum">
               <a:rPr lang="fr-BE" smtClean="0"/>
+              <a:pPr/>
               <a:t>‹N°›</a:t>
             </a:fld>
             <a:endParaRPr lang="fr-BE"/>
@@ -1472,7 +1484,8 @@
           <a:p>
             <a:fld id="{AA309A6D-C09C-4548-B29A-6CF363A7E532}" type="datetimeFigureOut">
               <a:rPr lang="fr-FR" smtClean="0"/>
-              <a:t>02/02/2014</a:t>
+              <a:pPr/>
+              <a:t>04/02/2014</a:t>
             </a:fld>
             <a:endParaRPr lang="fr-BE"/>
           </a:p>
@@ -1514,6 +1527,7 @@
           <a:p>
             <a:fld id="{CF4668DC-857F-487D-BFFA-8C0CA5037977}" type="slidenum">
               <a:rPr lang="fr-BE" smtClean="0"/>
+              <a:pPr/>
               <a:t>‹N°›</a:t>
             </a:fld>
             <a:endParaRPr lang="fr-BE"/>
@@ -1755,7 +1769,8 @@
           <a:p>
             <a:fld id="{AA309A6D-C09C-4548-B29A-6CF363A7E532}" type="datetimeFigureOut">
               <a:rPr lang="fr-FR" smtClean="0"/>
-              <a:t>02/02/2014</a:t>
+              <a:pPr/>
+              <a:t>04/02/2014</a:t>
             </a:fld>
             <a:endParaRPr lang="fr-BE"/>
           </a:p>
@@ -1797,6 +1812,7 @@
           <a:p>
             <a:fld id="{CF4668DC-857F-487D-BFFA-8C0CA5037977}" type="slidenum">
               <a:rPr lang="fr-BE" smtClean="0"/>
+              <a:pPr/>
               <a:t>‹N°›</a:t>
             </a:fld>
             <a:endParaRPr lang="fr-BE"/>
@@ -2172,7 +2188,8 @@
           <a:p>
             <a:fld id="{AA309A6D-C09C-4548-B29A-6CF363A7E532}" type="datetimeFigureOut">
               <a:rPr lang="fr-FR" smtClean="0"/>
-              <a:t>02/02/2014</a:t>
+              <a:pPr/>
+              <a:t>04/02/2014</a:t>
             </a:fld>
             <a:endParaRPr lang="fr-BE"/>
           </a:p>
@@ -2214,6 +2231,7 @@
           <a:p>
             <a:fld id="{CF4668DC-857F-487D-BFFA-8C0CA5037977}" type="slidenum">
               <a:rPr lang="fr-BE" smtClean="0"/>
+              <a:pPr/>
               <a:t>‹N°›</a:t>
             </a:fld>
             <a:endParaRPr lang="fr-BE"/>
@@ -2285,7 +2303,8 @@
           <a:p>
             <a:fld id="{AA309A6D-C09C-4548-B29A-6CF363A7E532}" type="datetimeFigureOut">
               <a:rPr lang="fr-FR" smtClean="0"/>
-              <a:t>02/02/2014</a:t>
+              <a:pPr/>
+              <a:t>04/02/2014</a:t>
             </a:fld>
             <a:endParaRPr lang="fr-BE"/>
           </a:p>
@@ -2327,6 +2346,7 @@
           <a:p>
             <a:fld id="{CF4668DC-857F-487D-BFFA-8C0CA5037977}" type="slidenum">
               <a:rPr lang="fr-BE" smtClean="0"/>
+              <a:pPr/>
               <a:t>‹N°›</a:t>
             </a:fld>
             <a:endParaRPr lang="fr-BE"/>
@@ -2375,7 +2395,8 @@
           <a:p>
             <a:fld id="{AA309A6D-C09C-4548-B29A-6CF363A7E532}" type="datetimeFigureOut">
               <a:rPr lang="fr-FR" smtClean="0"/>
-              <a:t>02/02/2014</a:t>
+              <a:pPr/>
+              <a:t>04/02/2014</a:t>
             </a:fld>
             <a:endParaRPr lang="fr-BE"/>
           </a:p>
@@ -2417,6 +2438,7 @@
           <a:p>
             <a:fld id="{CF4668DC-857F-487D-BFFA-8C0CA5037977}" type="slidenum">
               <a:rPr lang="fr-BE" smtClean="0"/>
+              <a:pPr/>
               <a:t>‹N°›</a:t>
             </a:fld>
             <a:endParaRPr lang="fr-BE"/>
@@ -2647,7 +2669,8 @@
           <a:p>
             <a:fld id="{AA309A6D-C09C-4548-B29A-6CF363A7E532}" type="datetimeFigureOut">
               <a:rPr lang="fr-FR" smtClean="0"/>
-              <a:t>02/02/2014</a:t>
+              <a:pPr/>
+              <a:t>04/02/2014</a:t>
             </a:fld>
             <a:endParaRPr lang="fr-BE"/>
           </a:p>
@@ -2689,6 +2712,7 @@
           <a:p>
             <a:fld id="{CF4668DC-857F-487D-BFFA-8C0CA5037977}" type="slidenum">
               <a:rPr lang="fr-BE" smtClean="0"/>
+              <a:pPr/>
               <a:t>‹N°›</a:t>
             </a:fld>
             <a:endParaRPr lang="fr-BE"/>
@@ -2895,7 +2919,8 @@
           <a:p>
             <a:fld id="{AA309A6D-C09C-4548-B29A-6CF363A7E532}" type="datetimeFigureOut">
               <a:rPr lang="fr-FR" smtClean="0"/>
-              <a:t>02/02/2014</a:t>
+              <a:pPr/>
+              <a:t>04/02/2014</a:t>
             </a:fld>
             <a:endParaRPr lang="fr-BE"/>
           </a:p>
@@ -2937,6 +2962,7 @@
           <a:p>
             <a:fld id="{CF4668DC-857F-487D-BFFA-8C0CA5037977}" type="slidenum">
               <a:rPr lang="fr-BE" smtClean="0"/>
+              <a:pPr/>
               <a:t>‹N°›</a:t>
             </a:fld>
             <a:endParaRPr lang="fr-BE"/>
@@ -3103,7 +3129,8 @@
           <a:p>
             <a:fld id="{AA309A6D-C09C-4548-B29A-6CF363A7E532}" type="datetimeFigureOut">
               <a:rPr lang="fr-FR" smtClean="0"/>
-              <a:t>02/02/2014</a:t>
+              <a:pPr/>
+              <a:t>04/02/2014</a:t>
             </a:fld>
             <a:endParaRPr lang="fr-BE"/>
           </a:p>
@@ -3181,6 +3208,7 @@
           <a:p>
             <a:fld id="{CF4668DC-857F-487D-BFFA-8C0CA5037977}" type="slidenum">
               <a:rPr lang="fr-BE" smtClean="0"/>
+              <a:pPr/>
               <a:t>‹N°›</a:t>
             </a:fld>
             <a:endParaRPr lang="fr-BE"/>
@@ -3473,8 +3501,8 @@
           <a:chExt cx="0" cy="0"/>
         </a:xfrm>
       </p:grpSpPr>
-      <mc:AlternateContent xmlns:mc="http://schemas.openxmlformats.org/markup-compatibility/2006" xmlns:a14="http://schemas.microsoft.com/office/drawing/2010/main">
-        <mc:Choice Requires="a14">
+      <mc:AlternateContent xmlns:mc="http://schemas.openxmlformats.org/markup-compatibility/2006">
+        <mc:Choice xmlns:a14="http://schemas.microsoft.com/office/drawing/2010/main" xmlns="" Requires="a14">
           <p:sp>
             <p:nvSpPr>
               <p:cNvPr id="4" name="Rectangle 3"/>
@@ -3529,7 +3557,7 @@
             </p:txBody>
           </p:sp>
         </mc:Choice>
-        <mc:Fallback xmlns="">
+        <mc:Fallback>
           <p:sp>
             <p:nvSpPr>
               <p:cNvPr id="4" name="Rectangle 3"/>
@@ -3638,8 +3666,8 @@
           </a:fontRef>
         </p:style>
       </p:cxnSp>
-      <mc:AlternateContent xmlns:mc="http://schemas.openxmlformats.org/markup-compatibility/2006" xmlns:a14="http://schemas.microsoft.com/office/drawing/2010/main">
-        <mc:Choice Requires="a14">
+      <mc:AlternateContent xmlns:mc="http://schemas.openxmlformats.org/markup-compatibility/2006">
+        <mc:Choice xmlns:a14="http://schemas.microsoft.com/office/drawing/2010/main" xmlns="" Requires="a14">
           <p:sp>
             <p:nvSpPr>
               <p:cNvPr id="10" name="ZoneTexte 9"/>
@@ -3808,7 +3836,7 @@
             </p:txBody>
           </p:sp>
         </mc:Choice>
-        <mc:Fallback xmlns="">
+        <mc:Fallback>
           <p:sp>
             <p:nvSpPr>
               <p:cNvPr id="10" name="ZoneTexte 9"/>
@@ -3847,8 +3875,8 @@
           </p:sp>
         </mc:Fallback>
       </mc:AlternateContent>
-      <mc:AlternateContent xmlns:mc="http://schemas.openxmlformats.org/markup-compatibility/2006" xmlns:a14="http://schemas.microsoft.com/office/drawing/2010/main">
-        <mc:Choice Requires="a14">
+      <mc:AlternateContent xmlns:mc="http://schemas.openxmlformats.org/markup-compatibility/2006">
+        <mc:Choice xmlns:a14="http://schemas.microsoft.com/office/drawing/2010/main" xmlns="" Requires="a14">
           <p:sp>
             <p:nvSpPr>
               <p:cNvPr id="11" name="ZoneTexte 10"/>
@@ -3909,7 +3937,7 @@
             </p:txBody>
           </p:sp>
         </mc:Choice>
-        <mc:Fallback xmlns="">
+        <mc:Fallback>
           <p:sp>
             <p:nvSpPr>
               <p:cNvPr id="11" name="ZoneTexte 10"/>
@@ -3948,8 +3976,8 @@
           </p:sp>
         </mc:Fallback>
       </mc:AlternateContent>
-      <mc:AlternateContent xmlns:mc="http://schemas.openxmlformats.org/markup-compatibility/2006" xmlns:a14="http://schemas.microsoft.com/office/drawing/2010/main">
-        <mc:Choice Requires="a14">
+      <mc:AlternateContent xmlns:mc="http://schemas.openxmlformats.org/markup-compatibility/2006">
+        <mc:Choice xmlns:a14="http://schemas.microsoft.com/office/drawing/2010/main" xmlns="" Requires="a14">
           <p:sp>
             <p:nvSpPr>
               <p:cNvPr id="12" name="Rectangle 11"/>
@@ -4023,7 +4051,7 @@
             </p:txBody>
           </p:sp>
         </mc:Choice>
-        <mc:Fallback xmlns="">
+        <mc:Fallback>
           <p:sp>
             <p:nvSpPr>
               <p:cNvPr id="12" name="Rectangle 11"/>
@@ -4132,8 +4160,8 @@
           </a:fontRef>
         </p:style>
       </p:cxnSp>
-      <mc:AlternateContent xmlns:mc="http://schemas.openxmlformats.org/markup-compatibility/2006" xmlns:a14="http://schemas.microsoft.com/office/drawing/2010/main">
-        <mc:Choice Requires="a14">
+      <mc:AlternateContent xmlns:mc="http://schemas.openxmlformats.org/markup-compatibility/2006">
+        <mc:Choice xmlns:a14="http://schemas.microsoft.com/office/drawing/2010/main" xmlns="" Requires="a14">
           <p:sp>
             <p:nvSpPr>
               <p:cNvPr id="15" name="ZoneTexte 14"/>
@@ -4302,7 +4330,7 @@
             </p:txBody>
           </p:sp>
         </mc:Choice>
-        <mc:Fallback xmlns="">
+        <mc:Fallback>
           <p:sp>
             <p:nvSpPr>
               <p:cNvPr id="15" name="ZoneTexte 14"/>
@@ -4341,8 +4369,8 @@
           </p:sp>
         </mc:Fallback>
       </mc:AlternateContent>
-      <mc:AlternateContent xmlns:mc="http://schemas.openxmlformats.org/markup-compatibility/2006" xmlns:a14="http://schemas.microsoft.com/office/drawing/2010/main">
-        <mc:Choice Requires="a14">
+      <mc:AlternateContent xmlns:mc="http://schemas.openxmlformats.org/markup-compatibility/2006">
+        <mc:Choice xmlns:a14="http://schemas.microsoft.com/office/drawing/2010/main" xmlns="" Requires="a14">
           <p:sp>
             <p:nvSpPr>
               <p:cNvPr id="16" name="ZoneTexte 15"/>
@@ -4403,7 +4431,7 @@
             </p:txBody>
           </p:sp>
         </mc:Choice>
-        <mc:Fallback xmlns="">
+        <mc:Fallback>
           <p:sp>
             <p:nvSpPr>
               <p:cNvPr id="16" name="ZoneTexte 15"/>
@@ -4442,8 +4470,8 @@
           </p:sp>
         </mc:Fallback>
       </mc:AlternateContent>
-      <mc:AlternateContent xmlns:mc="http://schemas.openxmlformats.org/markup-compatibility/2006" xmlns:a14="http://schemas.microsoft.com/office/drawing/2010/main">
-        <mc:Choice Requires="a14">
+      <mc:AlternateContent xmlns:mc="http://schemas.openxmlformats.org/markup-compatibility/2006">
+        <mc:Choice xmlns:a14="http://schemas.microsoft.com/office/drawing/2010/main" xmlns="" Requires="a14">
           <p:sp>
             <p:nvSpPr>
               <p:cNvPr id="19" name="Rectangle 18"/>
@@ -4498,7 +4526,7 @@
             </p:txBody>
           </p:sp>
         </mc:Choice>
-        <mc:Fallback xmlns="">
+        <mc:Fallback>
           <p:sp>
             <p:nvSpPr>
               <p:cNvPr id="19" name="Rectangle 18"/>
@@ -4607,8 +4635,8 @@
           </a:fontRef>
         </p:style>
       </p:cxnSp>
-      <mc:AlternateContent xmlns:mc="http://schemas.openxmlformats.org/markup-compatibility/2006" xmlns:a14="http://schemas.microsoft.com/office/drawing/2010/main">
-        <mc:Choice Requires="a14">
+      <mc:AlternateContent xmlns:mc="http://schemas.openxmlformats.org/markup-compatibility/2006">
+        <mc:Choice xmlns:a14="http://schemas.microsoft.com/office/drawing/2010/main" xmlns="" Requires="a14">
           <p:sp>
             <p:nvSpPr>
               <p:cNvPr id="22" name="ZoneTexte 21"/>
@@ -4777,7 +4805,7 @@
             </p:txBody>
           </p:sp>
         </mc:Choice>
-        <mc:Fallback xmlns="">
+        <mc:Fallback>
           <p:sp>
             <p:nvSpPr>
               <p:cNvPr id="22" name="ZoneTexte 21"/>
@@ -4816,8 +4844,8 @@
           </p:sp>
         </mc:Fallback>
       </mc:AlternateContent>
-      <mc:AlternateContent xmlns:mc="http://schemas.openxmlformats.org/markup-compatibility/2006" xmlns:a14="http://schemas.microsoft.com/office/drawing/2010/main">
-        <mc:Choice Requires="a14">
+      <mc:AlternateContent xmlns:mc="http://schemas.openxmlformats.org/markup-compatibility/2006">
+        <mc:Choice xmlns:a14="http://schemas.microsoft.com/office/drawing/2010/main" xmlns="" Requires="a14">
           <p:sp>
             <p:nvSpPr>
               <p:cNvPr id="23" name="ZoneTexte 22"/>
@@ -4878,7 +4906,7 @@
             </p:txBody>
           </p:sp>
         </mc:Choice>
-        <mc:Fallback xmlns="">
+        <mc:Fallback>
           <p:sp>
             <p:nvSpPr>
               <p:cNvPr id="23" name="ZoneTexte 22"/>
@@ -4917,8 +4945,8 @@
           </p:sp>
         </mc:Fallback>
       </mc:AlternateContent>
-      <mc:AlternateContent xmlns:mc="http://schemas.openxmlformats.org/markup-compatibility/2006" xmlns:a14="http://schemas.microsoft.com/office/drawing/2010/main">
-        <mc:Choice Requires="a14">
+      <mc:AlternateContent xmlns:mc="http://schemas.openxmlformats.org/markup-compatibility/2006">
+        <mc:Choice xmlns:a14="http://schemas.microsoft.com/office/drawing/2010/main" xmlns="" Requires="a14">
           <p:sp>
             <p:nvSpPr>
               <p:cNvPr id="26" name="Rectangle 25"/>
@@ -4992,7 +5020,7 @@
             </p:txBody>
           </p:sp>
         </mc:Choice>
-        <mc:Fallback xmlns="">
+        <mc:Fallback>
           <p:sp>
             <p:nvSpPr>
               <p:cNvPr id="26" name="Rectangle 25"/>
@@ -5101,8 +5129,8 @@
           </a:fontRef>
         </p:style>
       </p:cxnSp>
-      <mc:AlternateContent xmlns:mc="http://schemas.openxmlformats.org/markup-compatibility/2006" xmlns:a14="http://schemas.microsoft.com/office/drawing/2010/main">
-        <mc:Choice Requires="a14">
+      <mc:AlternateContent xmlns:mc="http://schemas.openxmlformats.org/markup-compatibility/2006">
+        <mc:Choice xmlns:a14="http://schemas.microsoft.com/office/drawing/2010/main" xmlns="" Requires="a14">
           <p:sp>
             <p:nvSpPr>
               <p:cNvPr id="29" name="ZoneTexte 28"/>
@@ -5271,7 +5299,7 @@
             </p:txBody>
           </p:sp>
         </mc:Choice>
-        <mc:Fallback xmlns="">
+        <mc:Fallback>
           <p:sp>
             <p:nvSpPr>
               <p:cNvPr id="29" name="ZoneTexte 28"/>
@@ -5310,8 +5338,8 @@
           </p:sp>
         </mc:Fallback>
       </mc:AlternateContent>
-      <mc:AlternateContent xmlns:mc="http://schemas.openxmlformats.org/markup-compatibility/2006" xmlns:a14="http://schemas.microsoft.com/office/drawing/2010/main">
-        <mc:Choice Requires="a14">
+      <mc:AlternateContent xmlns:mc="http://schemas.openxmlformats.org/markup-compatibility/2006">
+        <mc:Choice xmlns:a14="http://schemas.microsoft.com/office/drawing/2010/main" xmlns="" Requires="a14">
           <p:sp>
             <p:nvSpPr>
               <p:cNvPr id="30" name="ZoneTexte 29"/>
@@ -5372,7 +5400,7 @@
             </p:txBody>
           </p:sp>
         </mc:Choice>
-        <mc:Fallback xmlns="">
+        <mc:Fallback>
           <p:sp>
             <p:nvSpPr>
               <p:cNvPr id="30" name="ZoneTexte 29"/>
@@ -5411,8 +5439,8 @@
           </p:sp>
         </mc:Fallback>
       </mc:AlternateContent>
-      <mc:AlternateContent xmlns:mc="http://schemas.openxmlformats.org/markup-compatibility/2006" xmlns:a14="http://schemas.microsoft.com/office/drawing/2010/main">
-        <mc:Choice Requires="a14">
+      <mc:AlternateContent xmlns:mc="http://schemas.openxmlformats.org/markup-compatibility/2006">
+        <mc:Choice xmlns:a14="http://schemas.microsoft.com/office/drawing/2010/main" xmlns="" Requires="a14">
           <p:sp>
             <p:nvSpPr>
               <p:cNvPr id="31" name="Rectangle 30"/>
@@ -5498,7 +5526,7 @@
             </p:txBody>
           </p:sp>
         </mc:Choice>
-        <mc:Fallback xmlns="">
+        <mc:Fallback>
           <p:sp>
             <p:nvSpPr>
               <p:cNvPr id="31" name="Rectangle 30"/>
@@ -5607,8 +5635,8 @@
           </a:fontRef>
         </p:style>
       </p:cxnSp>
-      <mc:AlternateContent xmlns:mc="http://schemas.openxmlformats.org/markup-compatibility/2006" xmlns:a14="http://schemas.microsoft.com/office/drawing/2010/main">
-        <mc:Choice Requires="a14">
+      <mc:AlternateContent xmlns:mc="http://schemas.openxmlformats.org/markup-compatibility/2006">
+        <mc:Choice xmlns:a14="http://schemas.microsoft.com/office/drawing/2010/main" xmlns="" Requires="a14">
           <p:sp>
             <p:nvSpPr>
               <p:cNvPr id="34" name="ZoneTexte 33"/>
@@ -5777,7 +5805,7 @@
             </p:txBody>
           </p:sp>
         </mc:Choice>
-        <mc:Fallback xmlns="">
+        <mc:Fallback>
           <p:sp>
             <p:nvSpPr>
               <p:cNvPr id="34" name="ZoneTexte 33"/>
@@ -5816,8 +5844,8 @@
           </p:sp>
         </mc:Fallback>
       </mc:AlternateContent>
-      <mc:AlternateContent xmlns:mc="http://schemas.openxmlformats.org/markup-compatibility/2006" xmlns:a14="http://schemas.microsoft.com/office/drawing/2010/main">
-        <mc:Choice Requires="a14">
+      <mc:AlternateContent xmlns:mc="http://schemas.openxmlformats.org/markup-compatibility/2006">
+        <mc:Choice xmlns:a14="http://schemas.microsoft.com/office/drawing/2010/main" xmlns="" Requires="a14">
           <p:sp>
             <p:nvSpPr>
               <p:cNvPr id="35" name="ZoneTexte 34"/>
@@ -5878,7 +5906,7 @@
             </p:txBody>
           </p:sp>
         </mc:Choice>
-        <mc:Fallback xmlns="">
+        <mc:Fallback>
           <p:sp>
             <p:nvSpPr>
               <p:cNvPr id="35" name="ZoneTexte 34"/>
@@ -5917,8 +5945,8 @@
           </p:sp>
         </mc:Fallback>
       </mc:AlternateContent>
-      <mc:AlternateContent xmlns:mc="http://schemas.openxmlformats.org/markup-compatibility/2006" xmlns:a14="http://schemas.microsoft.com/office/drawing/2010/main">
-        <mc:Choice Requires="a14">
+      <mc:AlternateContent xmlns:mc="http://schemas.openxmlformats.org/markup-compatibility/2006">
+        <mc:Choice xmlns:a14="http://schemas.microsoft.com/office/drawing/2010/main" xmlns="" Requires="a14">
           <p:sp>
             <p:nvSpPr>
               <p:cNvPr id="40" name="Rectangle 39"/>
@@ -6123,7 +6151,7 @@
             </p:txBody>
           </p:sp>
         </mc:Choice>
-        <mc:Fallback xmlns="">
+        <mc:Fallback>
           <p:sp>
             <p:nvSpPr>
               <p:cNvPr id="40" name="Rectangle 39"/>
@@ -6197,8 +6225,8 @@
           </a:fontRef>
         </p:style>
       </p:cxnSp>
-      <mc:AlternateContent xmlns:mc="http://schemas.openxmlformats.org/markup-compatibility/2006" xmlns:a14="http://schemas.microsoft.com/office/drawing/2010/main">
-        <mc:Choice Requires="a14">
+      <mc:AlternateContent xmlns:mc="http://schemas.openxmlformats.org/markup-compatibility/2006">
+        <mc:Choice xmlns:a14="http://schemas.microsoft.com/office/drawing/2010/main" xmlns="" Requires="a14">
           <p:sp>
             <p:nvSpPr>
               <p:cNvPr id="43" name="ZoneTexte 42"/>
@@ -6367,7 +6395,7 @@
             </p:txBody>
           </p:sp>
         </mc:Choice>
-        <mc:Fallback xmlns="">
+        <mc:Fallback>
           <p:sp>
             <p:nvSpPr>
               <p:cNvPr id="43" name="ZoneTexte 42"/>
@@ -6406,8 +6434,8 @@
           </p:sp>
         </mc:Fallback>
       </mc:AlternateContent>
-      <mc:AlternateContent xmlns:mc="http://schemas.openxmlformats.org/markup-compatibility/2006" xmlns:a14="http://schemas.microsoft.com/office/drawing/2010/main">
-        <mc:Choice Requires="a14">
+      <mc:AlternateContent xmlns:mc="http://schemas.openxmlformats.org/markup-compatibility/2006">
+        <mc:Choice xmlns:a14="http://schemas.microsoft.com/office/drawing/2010/main" xmlns="" Requires="a14">
           <p:sp>
             <p:nvSpPr>
               <p:cNvPr id="44" name="ZoneTexte 43"/>
@@ -6468,7 +6496,7 @@
             </p:txBody>
           </p:sp>
         </mc:Choice>
-        <mc:Fallback xmlns="">
+        <mc:Fallback>
           <p:sp>
             <p:nvSpPr>
               <p:cNvPr id="44" name="ZoneTexte 43"/>
@@ -6543,7 +6571,7 @@
     </p:spTree>
     <p:extLst>
       <p:ext uri="{BB962C8B-B14F-4D97-AF65-F5344CB8AC3E}">
-        <p14:creationId xmlns:p14="http://schemas.microsoft.com/office/powerpoint/2010/main" val="2773039030"/>
+        <p14:creationId xmlns:p14="http://schemas.microsoft.com/office/powerpoint/2010/main" xmlns="" val="2773039030"/>
       </p:ext>
     </p:extLst>
   </p:cSld>
@@ -6582,7 +6610,7 @@
           <a:blip r:embed="rId3" cstate="print">
             <a:extLst>
               <a:ext uri="{28A0092B-C50C-407E-A947-70E740481C1C}">
-                <a14:useLocalDpi xmlns:a14="http://schemas.microsoft.com/office/drawing/2010/main" val="0"/>
+                <a14:useLocalDpi xmlns:a14="http://schemas.microsoft.com/office/drawing/2010/main" xmlns="" val="0"/>
               </a:ext>
             </a:extLst>
           </a:blip>
@@ -6602,7 +6630,7 @@
           <a:noFill/>
           <a:extLst>
             <a:ext uri="{909E8E84-426E-40DD-AFC4-6F175D3DCCD1}">
-              <a14:hiddenFill xmlns:a14="http://schemas.microsoft.com/office/drawing/2010/main">
+              <a14:hiddenFill xmlns:a14="http://schemas.microsoft.com/office/drawing/2010/main" xmlns="">
                 <a:solidFill>
                   <a:srgbClr val="FFFFFF"/>
                 </a:solidFill>
@@ -6637,7 +6665,7 @@
             <a:blip r:embed="rId4" cstate="print">
               <a:extLst>
                 <a:ext uri="{28A0092B-C50C-407E-A947-70E740481C1C}">
-                  <a14:useLocalDpi xmlns:a14="http://schemas.microsoft.com/office/drawing/2010/main" val="0"/>
+                  <a14:useLocalDpi xmlns:a14="http://schemas.microsoft.com/office/drawing/2010/main" xmlns="" val="0"/>
                 </a:ext>
               </a:extLst>
             </a:blip>
@@ -6657,7 +6685,7 @@
             <a:noFill/>
             <a:extLst>
               <a:ext uri="{909E8E84-426E-40DD-AFC4-6F175D3DCCD1}">
-                <a14:hiddenFill xmlns:a14="http://schemas.microsoft.com/office/drawing/2010/main">
+                <a14:hiddenFill xmlns:a14="http://schemas.microsoft.com/office/drawing/2010/main" xmlns="">
                   <a:solidFill>
                     <a:srgbClr val="FFFFFF"/>
                   </a:solidFill>
@@ -6678,7 +6706,7 @@
             <a:blip r:embed="rId5" cstate="print">
               <a:extLst>
                 <a:ext uri="{28A0092B-C50C-407E-A947-70E740481C1C}">
-                  <a14:useLocalDpi xmlns:a14="http://schemas.microsoft.com/office/drawing/2010/main" val="0"/>
+                  <a14:useLocalDpi xmlns:a14="http://schemas.microsoft.com/office/drawing/2010/main" xmlns="" val="0"/>
                 </a:ext>
               </a:extLst>
             </a:blip>
@@ -6698,7 +6726,7 @@
             <a:noFill/>
             <a:extLst>
               <a:ext uri="{909E8E84-426E-40DD-AFC4-6F175D3DCCD1}">
-                <a14:hiddenFill xmlns:a14="http://schemas.microsoft.com/office/drawing/2010/main">
+                <a14:hiddenFill xmlns:a14="http://schemas.microsoft.com/office/drawing/2010/main" xmlns="">
                   <a:solidFill>
                     <a:srgbClr val="FFFFFF"/>
                   </a:solidFill>
@@ -6719,7 +6747,7 @@
             <a:blip r:embed="rId6" cstate="print">
               <a:extLst>
                 <a:ext uri="{28A0092B-C50C-407E-A947-70E740481C1C}">
-                  <a14:useLocalDpi xmlns:a14="http://schemas.microsoft.com/office/drawing/2010/main" val="0"/>
+                  <a14:useLocalDpi xmlns:a14="http://schemas.microsoft.com/office/drawing/2010/main" xmlns="" val="0"/>
                 </a:ext>
               </a:extLst>
             </a:blip>
@@ -6739,7 +6767,7 @@
             <a:noFill/>
             <a:extLst>
               <a:ext uri="{909E8E84-426E-40DD-AFC4-6F175D3DCCD1}">
-                <a14:hiddenFill xmlns:a14="http://schemas.microsoft.com/office/drawing/2010/main">
+                <a14:hiddenFill xmlns:a14="http://schemas.microsoft.com/office/drawing/2010/main" xmlns="">
                   <a:solidFill>
                     <a:srgbClr val="FFFFFF"/>
                   </a:solidFill>
@@ -6760,7 +6788,7 @@
             <a:blip r:embed="rId7" cstate="print">
               <a:extLst>
                 <a:ext uri="{28A0092B-C50C-407E-A947-70E740481C1C}">
-                  <a14:useLocalDpi xmlns:a14="http://schemas.microsoft.com/office/drawing/2010/main" val="0"/>
+                  <a14:useLocalDpi xmlns:a14="http://schemas.microsoft.com/office/drawing/2010/main" xmlns="" val="0"/>
                 </a:ext>
               </a:extLst>
             </a:blip>
@@ -6780,7 +6808,7 @@
             <a:noFill/>
             <a:extLst>
               <a:ext uri="{909E8E84-426E-40DD-AFC4-6F175D3DCCD1}">
-                <a14:hiddenFill xmlns:a14="http://schemas.microsoft.com/office/drawing/2010/main">
+                <a14:hiddenFill xmlns:a14="http://schemas.microsoft.com/office/drawing/2010/main" xmlns="">
                   <a:solidFill>
                     <a:srgbClr val="FFFFFF"/>
                   </a:solidFill>
@@ -7345,9 +7373,112 @@
     </p:spTree>
     <p:extLst>
       <p:ext uri="{BB962C8B-B14F-4D97-AF65-F5344CB8AC3E}">
-        <p14:creationId xmlns:p14="http://schemas.microsoft.com/office/powerpoint/2010/main" val="531239304"/>
+        <p14:creationId xmlns:p14="http://schemas.microsoft.com/office/powerpoint/2010/main" xmlns="" val="531239304"/>
       </p:ext>
     </p:extLst>
+  </p:cSld>
+  <p:clrMapOvr>
+    <a:masterClrMapping/>
+  </p:clrMapOvr>
+</p:sld>
+</file>
+
+<file path=ppt/slides/slide3.xml><?xml version="1.0" encoding="utf-8"?>
+<p:sld xmlns:a="http://schemas.openxmlformats.org/drawingml/2006/main" xmlns:r="http://schemas.openxmlformats.org/officeDocument/2006/relationships" xmlns:p="http://schemas.openxmlformats.org/presentationml/2006/main">
+  <p:cSld>
+    <p:spTree>
+      <p:nvGrpSpPr>
+        <p:cNvPr id="1" name=""/>
+        <p:cNvGrpSpPr/>
+        <p:nvPr/>
+      </p:nvGrpSpPr>
+      <p:grpSpPr>
+        <a:xfrm>
+          <a:off x="0" y="0"/>
+          <a:ext cx="0" cy="0"/>
+          <a:chOff x="0" y="0"/>
+          <a:chExt cx="0" cy="0"/>
+        </a:xfrm>
+      </p:grpSpPr>
+      <p:pic>
+        <p:nvPicPr>
+          <p:cNvPr id="1026" name="Picture 2"/>
+          <p:cNvPicPr>
+            <a:picLocks noChangeAspect="1" noChangeArrowheads="1"/>
+          </p:cNvPicPr>
+          <p:nvPr/>
+        </p:nvPicPr>
+        <p:blipFill>
+          <a:blip r:embed="rId2"/>
+          <a:srcRect/>
+          <a:stretch>
+            <a:fillRect/>
+          </a:stretch>
+        </p:blipFill>
+        <p:spPr bwMode="auto">
+          <a:xfrm>
+            <a:off x="714348" y="1187709"/>
+            <a:ext cx="3776354" cy="2880000"/>
+          </a:xfrm>
+          <a:prstGeom prst="rect">
+            <a:avLst/>
+          </a:prstGeom>
+          <a:ln>
+            <a:noFill/>
+          </a:ln>
+          <a:effectLst>
+            <a:outerShdw blurRad="292100" dist="139700" dir="2700000" algn="tl" rotWithShape="0">
+              <a:srgbClr val="333333">
+                <a:alpha val="65000"/>
+              </a:srgbClr>
+            </a:outerShdw>
+          </a:effectLst>
+          <a:scene3d>
+            <a:camera prst="isometricOffAxis1Right"/>
+            <a:lightRig rig="threePt" dir="t"/>
+          </a:scene3d>
+        </p:spPr>
+      </p:pic>
+      <p:pic>
+        <p:nvPicPr>
+          <p:cNvPr id="1027" name="Picture 3"/>
+          <p:cNvPicPr>
+            <a:picLocks noChangeAspect="1" noChangeArrowheads="1"/>
+          </p:cNvPicPr>
+          <p:nvPr/>
+        </p:nvPicPr>
+        <p:blipFill>
+          <a:blip r:embed="rId3"/>
+          <a:srcRect/>
+          <a:stretch>
+            <a:fillRect/>
+          </a:stretch>
+        </p:blipFill>
+        <p:spPr bwMode="auto">
+          <a:xfrm>
+            <a:off x="2214546" y="1214422"/>
+            <a:ext cx="3486942" cy="2880000"/>
+          </a:xfrm>
+          <a:prstGeom prst="rect">
+            <a:avLst/>
+          </a:prstGeom>
+          <a:ln>
+            <a:noFill/>
+          </a:ln>
+          <a:effectLst>
+            <a:outerShdw blurRad="292100" dist="139700" dir="2700000" algn="tl" rotWithShape="0">
+              <a:srgbClr val="333333">
+                <a:alpha val="65000"/>
+              </a:srgbClr>
+            </a:outerShdw>
+          </a:effectLst>
+          <a:scene3d>
+            <a:camera prst="isometricOffAxis1Right"/>
+            <a:lightRig rig="threePt" dir="t"/>
+          </a:scene3d>
+        </p:spPr>
+      </p:pic>
+    </p:spTree>
   </p:cSld>
   <p:clrMapOvr>
     <a:masterClrMapping/>

</xml_diff>